<commit_message>
changed something in presentation slide
</commit_message>
<xml_diff>
--- a/Slide.pptx
+++ b/Slide.pptx
@@ -469,7 +469,7 @@
           <a:p>
             <a:fld id="{7B80997C-7AF8-4458-85DA-451BC039AC26}" type="datetimeFigureOut">
               <a:rPr lang="en-SG" smtClean="0"/>
-              <a:t>18/4/2021</a:t>
+              <a:t>28/4/2021</a:t>
             </a:fld>
             <a:endParaRPr lang="en-SG"/>
           </a:p>
@@ -669,7 +669,7 @@
           <a:p>
             <a:fld id="{7B80997C-7AF8-4458-85DA-451BC039AC26}" type="datetimeFigureOut">
               <a:rPr lang="en-SG" smtClean="0"/>
-              <a:t>18/4/2021</a:t>
+              <a:t>28/4/2021</a:t>
             </a:fld>
             <a:endParaRPr lang="en-SG"/>
           </a:p>
@@ -879,7 +879,7 @@
           <a:p>
             <a:fld id="{7B80997C-7AF8-4458-85DA-451BC039AC26}" type="datetimeFigureOut">
               <a:rPr lang="en-SG" smtClean="0"/>
-              <a:t>18/4/2021</a:t>
+              <a:t>28/4/2021</a:t>
             </a:fld>
             <a:endParaRPr lang="en-SG"/>
           </a:p>
@@ -1079,7 +1079,7 @@
           <a:p>
             <a:fld id="{7B80997C-7AF8-4458-85DA-451BC039AC26}" type="datetimeFigureOut">
               <a:rPr lang="en-SG" smtClean="0"/>
-              <a:t>18/4/2021</a:t>
+              <a:t>28/4/2021</a:t>
             </a:fld>
             <a:endParaRPr lang="en-SG"/>
           </a:p>
@@ -1355,7 +1355,7 @@
           <a:p>
             <a:fld id="{7B80997C-7AF8-4458-85DA-451BC039AC26}" type="datetimeFigureOut">
               <a:rPr lang="en-SG" smtClean="0"/>
-              <a:t>18/4/2021</a:t>
+              <a:t>28/4/2021</a:t>
             </a:fld>
             <a:endParaRPr lang="en-SG"/>
           </a:p>
@@ -1623,7 +1623,7 @@
           <a:p>
             <a:fld id="{7B80997C-7AF8-4458-85DA-451BC039AC26}" type="datetimeFigureOut">
               <a:rPr lang="en-SG" smtClean="0"/>
-              <a:t>18/4/2021</a:t>
+              <a:t>28/4/2021</a:t>
             </a:fld>
             <a:endParaRPr lang="en-SG"/>
           </a:p>
@@ -2038,7 +2038,7 @@
           <a:p>
             <a:fld id="{7B80997C-7AF8-4458-85DA-451BC039AC26}" type="datetimeFigureOut">
               <a:rPr lang="en-SG" smtClean="0"/>
-              <a:t>18/4/2021</a:t>
+              <a:t>28/4/2021</a:t>
             </a:fld>
             <a:endParaRPr lang="en-SG"/>
           </a:p>
@@ -2180,7 +2180,7 @@
           <a:p>
             <a:fld id="{7B80997C-7AF8-4458-85DA-451BC039AC26}" type="datetimeFigureOut">
               <a:rPr lang="en-SG" smtClean="0"/>
-              <a:t>18/4/2021</a:t>
+              <a:t>28/4/2021</a:t>
             </a:fld>
             <a:endParaRPr lang="en-SG"/>
           </a:p>
@@ -2293,7 +2293,7 @@
           <a:p>
             <a:fld id="{7B80997C-7AF8-4458-85DA-451BC039AC26}" type="datetimeFigureOut">
               <a:rPr lang="en-SG" smtClean="0"/>
-              <a:t>18/4/2021</a:t>
+              <a:t>28/4/2021</a:t>
             </a:fld>
             <a:endParaRPr lang="en-SG"/>
           </a:p>
@@ -2606,7 +2606,7 @@
           <a:p>
             <a:fld id="{7B80997C-7AF8-4458-85DA-451BC039AC26}" type="datetimeFigureOut">
               <a:rPr lang="en-SG" smtClean="0"/>
-              <a:t>18/4/2021</a:t>
+              <a:t>28/4/2021</a:t>
             </a:fld>
             <a:endParaRPr lang="en-SG"/>
           </a:p>
@@ -2895,7 +2895,7 @@
           <a:p>
             <a:fld id="{7B80997C-7AF8-4458-85DA-451BC039AC26}" type="datetimeFigureOut">
               <a:rPr lang="en-SG" smtClean="0"/>
-              <a:t>18/4/2021</a:t>
+              <a:t>28/4/2021</a:t>
             </a:fld>
             <a:endParaRPr lang="en-SG"/>
           </a:p>
@@ -3138,7 +3138,7 @@
           <a:p>
             <a:fld id="{7B80997C-7AF8-4458-85DA-451BC039AC26}" type="datetimeFigureOut">
               <a:rPr lang="en-SG" smtClean="0"/>
-              <a:t>18/4/2021</a:t>
+              <a:t>28/4/2021</a:t>
             </a:fld>
             <a:endParaRPr lang="en-SG"/>
           </a:p>

</xml_diff>

<commit_message>
added dummy data and change some ofthe program
</commit_message>
<xml_diff>
--- a/Slide.pptx
+++ b/Slide.pptx
@@ -127,16 +127,24 @@
   <pc:docChgLst>
     <pc:chgData name="Jia Qi Poh" userId="bf4a214d-dfde-41c3-950c-daba288414af" providerId="ADAL" clId="{42A70EF2-2520-4FE4-9219-4FE36E2D76F3}"/>
     <pc:docChg chg="undo custSel modSld">
-      <pc:chgData name="Jia Qi Poh" userId="bf4a214d-dfde-41c3-950c-daba288414af" providerId="ADAL" clId="{42A70EF2-2520-4FE4-9219-4FE36E2D76F3}" dt="2021-04-18T04:13:37.277" v="197" actId="20577"/>
+      <pc:chgData name="Jia Qi Poh" userId="bf4a214d-dfde-41c3-950c-daba288414af" providerId="ADAL" clId="{42A70EF2-2520-4FE4-9219-4FE36E2D76F3}" dt="2021-04-30T02:02:48.128" v="207" actId="20577"/>
       <pc:docMkLst>
         <pc:docMk/>
       </pc:docMkLst>
       <pc:sldChg chg="modSp mod">
-        <pc:chgData name="Jia Qi Poh" userId="bf4a214d-dfde-41c3-950c-daba288414af" providerId="ADAL" clId="{42A70EF2-2520-4FE4-9219-4FE36E2D76F3}" dt="2021-04-18T04:10:08.683" v="129" actId="20577"/>
+        <pc:chgData name="Jia Qi Poh" userId="bf4a214d-dfde-41c3-950c-daba288414af" providerId="ADAL" clId="{42A70EF2-2520-4FE4-9219-4FE36E2D76F3}" dt="2021-04-30T02:02:48.128" v="207" actId="20577"/>
         <pc:sldMkLst>
           <pc:docMk/>
           <pc:sldMk cId="971818484" sldId="256"/>
         </pc:sldMkLst>
+        <pc:spChg chg="mod">
+          <ac:chgData name="Jia Qi Poh" userId="bf4a214d-dfde-41c3-950c-daba288414af" providerId="ADAL" clId="{42A70EF2-2520-4FE4-9219-4FE36E2D76F3}" dt="2021-04-30T02:02:48.128" v="207" actId="20577"/>
+          <ac:spMkLst>
+            <pc:docMk/>
+            <pc:sldMk cId="971818484" sldId="256"/>
+            <ac:spMk id="2" creationId="{D44B7E6B-C577-4EF1-BE5E-27F427542369}"/>
+          </ac:spMkLst>
+        </pc:spChg>
         <pc:spChg chg="mod">
           <ac:chgData name="Jia Qi Poh" userId="bf4a214d-dfde-41c3-950c-daba288414af" providerId="ADAL" clId="{42A70EF2-2520-4FE4-9219-4FE36E2D76F3}" dt="2021-04-18T04:10:08.683" v="129" actId="20577"/>
           <ac:spMkLst>
@@ -469,7 +477,7 @@
           <a:p>
             <a:fld id="{7B80997C-7AF8-4458-85DA-451BC039AC26}" type="datetimeFigureOut">
               <a:rPr lang="en-SG" smtClean="0"/>
-              <a:t>28/4/2021</a:t>
+              <a:t>30/4/2021</a:t>
             </a:fld>
             <a:endParaRPr lang="en-SG"/>
           </a:p>
@@ -669,7 +677,7 @@
           <a:p>
             <a:fld id="{7B80997C-7AF8-4458-85DA-451BC039AC26}" type="datetimeFigureOut">
               <a:rPr lang="en-SG" smtClean="0"/>
-              <a:t>28/4/2021</a:t>
+              <a:t>30/4/2021</a:t>
             </a:fld>
             <a:endParaRPr lang="en-SG"/>
           </a:p>
@@ -879,7 +887,7 @@
           <a:p>
             <a:fld id="{7B80997C-7AF8-4458-85DA-451BC039AC26}" type="datetimeFigureOut">
               <a:rPr lang="en-SG" smtClean="0"/>
-              <a:t>28/4/2021</a:t>
+              <a:t>30/4/2021</a:t>
             </a:fld>
             <a:endParaRPr lang="en-SG"/>
           </a:p>
@@ -1079,7 +1087,7 @@
           <a:p>
             <a:fld id="{7B80997C-7AF8-4458-85DA-451BC039AC26}" type="datetimeFigureOut">
               <a:rPr lang="en-SG" smtClean="0"/>
-              <a:t>28/4/2021</a:t>
+              <a:t>30/4/2021</a:t>
             </a:fld>
             <a:endParaRPr lang="en-SG"/>
           </a:p>
@@ -1355,7 +1363,7 @@
           <a:p>
             <a:fld id="{7B80997C-7AF8-4458-85DA-451BC039AC26}" type="datetimeFigureOut">
               <a:rPr lang="en-SG" smtClean="0"/>
-              <a:t>28/4/2021</a:t>
+              <a:t>30/4/2021</a:t>
             </a:fld>
             <a:endParaRPr lang="en-SG"/>
           </a:p>
@@ -1623,7 +1631,7 @@
           <a:p>
             <a:fld id="{7B80997C-7AF8-4458-85DA-451BC039AC26}" type="datetimeFigureOut">
               <a:rPr lang="en-SG" smtClean="0"/>
-              <a:t>28/4/2021</a:t>
+              <a:t>30/4/2021</a:t>
             </a:fld>
             <a:endParaRPr lang="en-SG"/>
           </a:p>
@@ -2038,7 +2046,7 @@
           <a:p>
             <a:fld id="{7B80997C-7AF8-4458-85DA-451BC039AC26}" type="datetimeFigureOut">
               <a:rPr lang="en-SG" smtClean="0"/>
-              <a:t>28/4/2021</a:t>
+              <a:t>30/4/2021</a:t>
             </a:fld>
             <a:endParaRPr lang="en-SG"/>
           </a:p>
@@ -2180,7 +2188,7 @@
           <a:p>
             <a:fld id="{7B80997C-7AF8-4458-85DA-451BC039AC26}" type="datetimeFigureOut">
               <a:rPr lang="en-SG" smtClean="0"/>
-              <a:t>28/4/2021</a:t>
+              <a:t>30/4/2021</a:t>
             </a:fld>
             <a:endParaRPr lang="en-SG"/>
           </a:p>
@@ -2293,7 +2301,7 @@
           <a:p>
             <a:fld id="{7B80997C-7AF8-4458-85DA-451BC039AC26}" type="datetimeFigureOut">
               <a:rPr lang="en-SG" smtClean="0"/>
-              <a:t>28/4/2021</a:t>
+              <a:t>30/4/2021</a:t>
             </a:fld>
             <a:endParaRPr lang="en-SG"/>
           </a:p>
@@ -2606,7 +2614,7 @@
           <a:p>
             <a:fld id="{7B80997C-7AF8-4458-85DA-451BC039AC26}" type="datetimeFigureOut">
               <a:rPr lang="en-SG" smtClean="0"/>
-              <a:t>28/4/2021</a:t>
+              <a:t>30/4/2021</a:t>
             </a:fld>
             <a:endParaRPr lang="en-SG"/>
           </a:p>
@@ -2895,7 +2903,7 @@
           <a:p>
             <a:fld id="{7B80997C-7AF8-4458-85DA-451BC039AC26}" type="datetimeFigureOut">
               <a:rPr lang="en-SG" smtClean="0"/>
-              <a:t>28/4/2021</a:t>
+              <a:t>30/4/2021</a:t>
             </a:fld>
             <a:endParaRPr lang="en-SG"/>
           </a:p>
@@ -3138,7 +3146,7 @@
           <a:p>
             <a:fld id="{7B80997C-7AF8-4458-85DA-451BC039AC26}" type="datetimeFigureOut">
               <a:rPr lang="en-SG" smtClean="0"/>
-              <a:t>28/4/2021</a:t>
+              <a:t>30/4/2021</a:t>
             </a:fld>
             <a:endParaRPr lang="en-SG"/>
           </a:p>
@@ -3580,7 +3588,7 @@
               <a:rPr lang="en-SG" dirty="0">
                 <a:latin typeface="Roboto"/>
               </a:rPr>
-              <a:t>Auto Check Email Domain</a:t>
+              <a:t>Auto Check PRUExpert Email Domain</a:t>
             </a:r>
           </a:p>
         </p:txBody>

</xml_diff>